<commit_message>
refactored better, working module alias
</commit_message>
<xml_diff>
--- a/doc/editor.pptx
+++ b/doc/editor.pptx
@@ -261,7 +261,7 @@
           <a:p>
             <a:fld id="{6E919959-57B7-4836-B2A5-8618707C523E}" type="datetimeFigureOut">
               <a:rPr lang="en-AU" smtClean="0"/>
-              <a:t>25/06/2019</a:t>
+              <a:t>29/06/2019</a:t>
             </a:fld>
             <a:endParaRPr lang="en-AU"/>
           </a:p>
@@ -461,7 +461,7 @@
           <a:p>
             <a:fld id="{6E919959-57B7-4836-B2A5-8618707C523E}" type="datetimeFigureOut">
               <a:rPr lang="en-AU" smtClean="0"/>
-              <a:t>25/06/2019</a:t>
+              <a:t>29/06/2019</a:t>
             </a:fld>
             <a:endParaRPr lang="en-AU"/>
           </a:p>
@@ -671,7 +671,7 @@
           <a:p>
             <a:fld id="{6E919959-57B7-4836-B2A5-8618707C523E}" type="datetimeFigureOut">
               <a:rPr lang="en-AU" smtClean="0"/>
-              <a:t>25/06/2019</a:t>
+              <a:t>29/06/2019</a:t>
             </a:fld>
             <a:endParaRPr lang="en-AU"/>
           </a:p>
@@ -871,7 +871,7 @@
           <a:p>
             <a:fld id="{6E919959-57B7-4836-B2A5-8618707C523E}" type="datetimeFigureOut">
               <a:rPr lang="en-AU" smtClean="0"/>
-              <a:t>25/06/2019</a:t>
+              <a:t>29/06/2019</a:t>
             </a:fld>
             <a:endParaRPr lang="en-AU"/>
           </a:p>
@@ -1147,7 +1147,7 @@
           <a:p>
             <a:fld id="{6E919959-57B7-4836-B2A5-8618707C523E}" type="datetimeFigureOut">
               <a:rPr lang="en-AU" smtClean="0"/>
-              <a:t>25/06/2019</a:t>
+              <a:t>29/06/2019</a:t>
             </a:fld>
             <a:endParaRPr lang="en-AU"/>
           </a:p>
@@ -1415,7 +1415,7 @@
           <a:p>
             <a:fld id="{6E919959-57B7-4836-B2A5-8618707C523E}" type="datetimeFigureOut">
               <a:rPr lang="en-AU" smtClean="0"/>
-              <a:t>25/06/2019</a:t>
+              <a:t>29/06/2019</a:t>
             </a:fld>
             <a:endParaRPr lang="en-AU"/>
           </a:p>
@@ -1830,7 +1830,7 @@
           <a:p>
             <a:fld id="{6E919959-57B7-4836-B2A5-8618707C523E}" type="datetimeFigureOut">
               <a:rPr lang="en-AU" smtClean="0"/>
-              <a:t>25/06/2019</a:t>
+              <a:t>29/06/2019</a:t>
             </a:fld>
             <a:endParaRPr lang="en-AU"/>
           </a:p>
@@ -1972,7 +1972,7 @@
           <a:p>
             <a:fld id="{6E919959-57B7-4836-B2A5-8618707C523E}" type="datetimeFigureOut">
               <a:rPr lang="en-AU" smtClean="0"/>
-              <a:t>25/06/2019</a:t>
+              <a:t>29/06/2019</a:t>
             </a:fld>
             <a:endParaRPr lang="en-AU"/>
           </a:p>
@@ -2085,7 +2085,7 @@
           <a:p>
             <a:fld id="{6E919959-57B7-4836-B2A5-8618707C523E}" type="datetimeFigureOut">
               <a:rPr lang="en-AU" smtClean="0"/>
-              <a:t>25/06/2019</a:t>
+              <a:t>29/06/2019</a:t>
             </a:fld>
             <a:endParaRPr lang="en-AU"/>
           </a:p>
@@ -2398,7 +2398,7 @@
           <a:p>
             <a:fld id="{6E919959-57B7-4836-B2A5-8618707C523E}" type="datetimeFigureOut">
               <a:rPr lang="en-AU" smtClean="0"/>
-              <a:t>25/06/2019</a:t>
+              <a:t>29/06/2019</a:t>
             </a:fld>
             <a:endParaRPr lang="en-AU"/>
           </a:p>
@@ -2687,7 +2687,7 @@
           <a:p>
             <a:fld id="{6E919959-57B7-4836-B2A5-8618707C523E}" type="datetimeFigureOut">
               <a:rPr lang="en-AU" smtClean="0"/>
-              <a:t>25/06/2019</a:t>
+              <a:t>29/06/2019</a:t>
             </a:fld>
             <a:endParaRPr lang="en-AU"/>
           </a:p>
@@ -2930,7 +2930,7 @@
           <a:p>
             <a:fld id="{6E919959-57B7-4836-B2A5-8618707C523E}" type="datetimeFigureOut">
               <a:rPr lang="en-AU" smtClean="0"/>
-              <a:t>25/06/2019</a:t>
+              <a:t>29/06/2019</a:t>
             </a:fld>
             <a:endParaRPr lang="en-AU"/>
           </a:p>
@@ -4357,8 +4357,8 @@
         </p:nvSpPr>
         <p:spPr>
           <a:xfrm>
-            <a:off x="194254" y="3637617"/>
-            <a:ext cx="11666150" cy="2900510"/>
+            <a:off x="194254" y="3555991"/>
+            <a:ext cx="11666150" cy="2250331"/>
           </a:xfrm>
           <a:prstGeom prst="rect">
             <a:avLst/>
@@ -4403,7 +4403,7 @@
         </p:nvSpPr>
         <p:spPr>
           <a:xfrm>
-            <a:off x="335921" y="4065303"/>
+            <a:off x="335921" y="3881134"/>
             <a:ext cx="11417301" cy="367785"/>
           </a:xfrm>
           <a:prstGeom prst="rect">
@@ -4449,7 +4449,7 @@
         </p:nvSpPr>
         <p:spPr>
           <a:xfrm>
-            <a:off x="402886" y="4127100"/>
+            <a:off x="402886" y="3942931"/>
             <a:ext cx="940108" cy="242666"/>
           </a:xfrm>
           <a:prstGeom prst="rect">
@@ -4497,7 +4497,7 @@
         </p:nvSpPr>
         <p:spPr>
           <a:xfrm>
-            <a:off x="333975" y="4938427"/>
+            <a:off x="333975" y="4754258"/>
             <a:ext cx="492370" cy="492370"/>
           </a:xfrm>
           <a:prstGeom prst="rect">
@@ -4559,7 +4559,7 @@
         </p:nvSpPr>
         <p:spPr>
           <a:xfrm>
-            <a:off x="1784632" y="4537580"/>
+            <a:off x="1784632" y="4353411"/>
             <a:ext cx="9964264" cy="242666"/>
           </a:xfrm>
           <a:prstGeom prst="rect">
@@ -4607,7 +4607,7 @@
         </p:nvSpPr>
         <p:spPr>
           <a:xfrm>
-            <a:off x="3247719" y="4503637"/>
+            <a:off x="3247719" y="4319468"/>
             <a:ext cx="262505" cy="291403"/>
           </a:xfrm>
           <a:prstGeom prst="downArrow">
@@ -4658,7 +4658,7 @@
         </p:nvSpPr>
         <p:spPr>
           <a:xfrm>
-            <a:off x="3461458" y="4526733"/>
+            <a:off x="3461458" y="4342564"/>
             <a:ext cx="639744" cy="246221"/>
           </a:xfrm>
           <a:prstGeom prst="rect">
@@ -4694,7 +4694,7 @@
         </p:nvSpPr>
         <p:spPr>
           <a:xfrm>
-            <a:off x="856395" y="5442825"/>
+            <a:off x="856395" y="5258656"/>
             <a:ext cx="492370" cy="492370"/>
           </a:xfrm>
           <a:prstGeom prst="rect">
@@ -4742,68 +4742,6 @@
           </a:p>
         </p:txBody>
       </p:sp>
-      <p:sp>
-        <p:nvSpPr>
-          <p:cNvPr id="58" name="Rectangle 57">
-            <a:extLst>
-              <a:ext uri="{FF2B5EF4-FFF2-40B4-BE49-F238E27FC236}">
-                <a16:creationId xmlns:a16="http://schemas.microsoft.com/office/drawing/2014/main" id="{ECD56DB8-EED7-45B8-9FEC-FD3EE14B991D}"/>
-              </a:ext>
-            </a:extLst>
-          </p:cNvPr>
-          <p:cNvSpPr/>
-          <p:nvPr/>
-        </p:nvSpPr>
-        <p:spPr>
-          <a:xfrm>
-            <a:off x="856395" y="5990491"/>
-            <a:ext cx="492370" cy="492370"/>
-          </a:xfrm>
-          <a:prstGeom prst="rect">
-            <a:avLst/>
-          </a:prstGeom>
-          <a:effectLst>
-            <a:outerShdw blurRad="50800" dist="38100" dir="2700000" algn="tl" rotWithShape="0">
-              <a:prstClr val="black">
-                <a:alpha val="40000"/>
-              </a:prstClr>
-            </a:outerShdw>
-          </a:effectLst>
-          <a:scene3d>
-            <a:camera prst="orthographicFront"/>
-            <a:lightRig rig="threePt" dir="t"/>
-          </a:scene3d>
-          <a:sp3d>
-            <a:bevelT w="165100" prst="coolSlant"/>
-          </a:sp3d>
-        </p:spPr>
-        <p:style>
-          <a:lnRef idx="1">
-            <a:schemeClr val="accent5"/>
-          </a:lnRef>
-          <a:fillRef idx="2">
-            <a:schemeClr val="accent5"/>
-          </a:fillRef>
-          <a:effectRef idx="1">
-            <a:schemeClr val="accent5"/>
-          </a:effectRef>
-          <a:fontRef idx="minor">
-            <a:schemeClr val="dk1"/>
-          </a:fontRef>
-        </p:style>
-        <p:txBody>
-          <a:bodyPr rtlCol="0" anchor="ctr"/>
-          <a:lstStyle/>
-          <a:p>
-            <a:pPr algn="ctr"/>
-            <a:r>
-              <a:rPr lang="en-GB" sz="800" dirty="0"/>
-              <a:t>Puppet</a:t>
-            </a:r>
-            <a:endParaRPr lang="en-AU" sz="800" dirty="0"/>
-          </a:p>
-        </p:txBody>
-      </p:sp>
       <p:cxnSp>
         <p:nvCxnSpPr>
           <p:cNvPr id="59" name="Straight Connector 58">
@@ -4820,7 +4758,7 @@
         </p:nvCxnSpPr>
         <p:spPr>
           <a:xfrm flipH="1">
-            <a:off x="872942" y="5441150"/>
+            <a:off x="872942" y="5256981"/>
             <a:ext cx="10875954" cy="0"/>
           </a:xfrm>
           <a:prstGeom prst="line">
@@ -4861,7 +4799,7 @@
         </p:nvCxnSpPr>
         <p:spPr>
           <a:xfrm flipH="1">
-            <a:off x="872942" y="5983760"/>
+            <a:off x="872942" y="5799591"/>
             <a:ext cx="10875954" cy="0"/>
           </a:xfrm>
           <a:prstGeom prst="line">
@@ -4902,7 +4840,7 @@
         </p:nvCxnSpPr>
         <p:spPr>
           <a:xfrm flipH="1">
-            <a:off x="331596" y="4913612"/>
+            <a:off x="331596" y="4729443"/>
             <a:ext cx="11417300" cy="0"/>
           </a:xfrm>
           <a:prstGeom prst="line">
@@ -4941,7 +4879,7 @@
         </p:nvSpPr>
         <p:spPr>
           <a:xfrm>
-            <a:off x="1835501" y="4975697"/>
+            <a:off x="1835501" y="4791528"/>
             <a:ext cx="9913395" cy="160699"/>
           </a:xfrm>
           <a:prstGeom prst="rect">
@@ -4996,7 +4934,7 @@
         </p:nvSpPr>
         <p:spPr>
           <a:xfrm>
-            <a:off x="1389879" y="4952048"/>
+            <a:off x="1389879" y="4767879"/>
             <a:ext cx="441631" cy="246221"/>
           </a:xfrm>
           <a:prstGeom prst="rect">
@@ -5033,7 +4971,7 @@
         </p:nvSpPr>
         <p:spPr>
           <a:xfrm>
-            <a:off x="1224011" y="5179650"/>
+            <a:off x="1224011" y="4995481"/>
             <a:ext cx="608062" cy="246221"/>
           </a:xfrm>
           <a:prstGeom prst="rect">
@@ -5070,7 +5008,7 @@
         </p:nvSpPr>
         <p:spPr>
           <a:xfrm>
-            <a:off x="1835501" y="5206658"/>
+            <a:off x="1835501" y="5022489"/>
             <a:ext cx="9913395" cy="157340"/>
           </a:xfrm>
           <a:prstGeom prst="rect">
@@ -5127,8 +5065,8 @@
         </p:nvCxnSpPr>
         <p:spPr>
           <a:xfrm>
-            <a:off x="1784632" y="4433088"/>
-            <a:ext cx="0" cy="2074894"/>
+            <a:off x="1784632" y="4248919"/>
+            <a:ext cx="0" cy="1546746"/>
           </a:xfrm>
           <a:prstGeom prst="line">
             <a:avLst/>
@@ -5173,9 +5111,9 @@
           <p:nvPr/>
         </p:nvCxnSpPr>
         <p:spPr>
-          <a:xfrm>
-            <a:off x="11753294" y="4433088"/>
-            <a:ext cx="0" cy="2074894"/>
+          <a:xfrm flipH="1">
+            <a:off x="11748896" y="4248919"/>
+            <a:ext cx="4398" cy="1557403"/>
           </a:xfrm>
           <a:prstGeom prst="line">
             <a:avLst/>
@@ -5219,7 +5157,7 @@
         </p:nvSpPr>
         <p:spPr>
           <a:xfrm>
-            <a:off x="2789797" y="4989982"/>
+            <a:off x="2789797" y="4805813"/>
             <a:ext cx="1812053" cy="145628"/>
           </a:xfrm>
           <a:prstGeom prst="roundRect">
@@ -5265,7 +5203,7 @@
         </p:nvSpPr>
         <p:spPr>
           <a:xfrm>
-            <a:off x="2751606" y="4958586"/>
+            <a:off x="2751606" y="4774417"/>
             <a:ext cx="200931" cy="200931"/>
           </a:xfrm>
           <a:prstGeom prst="ellipse">
@@ -5324,7 +5262,7 @@
         </p:nvSpPr>
         <p:spPr>
           <a:xfrm>
-            <a:off x="3375011" y="4952297"/>
+            <a:off x="3375011" y="4768128"/>
             <a:ext cx="200931" cy="200931"/>
           </a:xfrm>
           <a:prstGeom prst="ellipse">
@@ -5375,7 +5313,7 @@
         </p:nvSpPr>
         <p:spPr>
           <a:xfrm>
-            <a:off x="4589472" y="4986633"/>
+            <a:off x="4589472" y="4802464"/>
             <a:ext cx="1476384" cy="157340"/>
           </a:xfrm>
           <a:prstGeom prst="roundRect">
@@ -5419,7 +5357,7 @@
         </p:nvSpPr>
         <p:spPr>
           <a:xfrm>
-            <a:off x="4469590" y="4955580"/>
+            <a:off x="4469590" y="4771411"/>
             <a:ext cx="200931" cy="200931"/>
           </a:xfrm>
           <a:prstGeom prst="ellipse">
@@ -5470,7 +5408,7 @@
         </p:nvSpPr>
         <p:spPr>
           <a:xfrm>
-            <a:off x="6021301" y="4953816"/>
+            <a:off x="6021301" y="4769647"/>
             <a:ext cx="200931" cy="200931"/>
           </a:xfrm>
           <a:prstGeom prst="ellipse">
@@ -5718,8 +5656,8 @@
         </p:nvCxnSpPr>
         <p:spPr>
           <a:xfrm flipH="1">
-            <a:off x="3375012" y="4795040"/>
-            <a:ext cx="3960" cy="1743087"/>
+            <a:off x="3375011" y="4610871"/>
+            <a:ext cx="3961" cy="1184794"/>
           </a:xfrm>
           <a:prstGeom prst="line">
             <a:avLst/>
@@ -5763,7 +5701,7 @@
         </p:nvSpPr>
         <p:spPr>
           <a:xfrm>
-            <a:off x="7328176" y="5210007"/>
+            <a:off x="7328176" y="5025838"/>
             <a:ext cx="1812053" cy="145628"/>
           </a:xfrm>
           <a:prstGeom prst="roundRect">
@@ -5809,7 +5747,7 @@
         </p:nvSpPr>
         <p:spPr>
           <a:xfrm>
-            <a:off x="7289985" y="5178611"/>
+            <a:off x="7289985" y="4994442"/>
             <a:ext cx="200931" cy="200931"/>
           </a:xfrm>
           <a:prstGeom prst="ellipse">
@@ -5868,7 +5806,7 @@
         </p:nvSpPr>
         <p:spPr>
           <a:xfrm>
-            <a:off x="7913390" y="5172322"/>
+            <a:off x="7913390" y="4988153"/>
             <a:ext cx="200931" cy="200931"/>
           </a:xfrm>
           <a:prstGeom prst="ellipse">
@@ -5919,7 +5857,7 @@
         </p:nvSpPr>
         <p:spPr>
           <a:xfrm>
-            <a:off x="9127851" y="5206658"/>
+            <a:off x="9127851" y="5022489"/>
             <a:ext cx="1476384" cy="157340"/>
           </a:xfrm>
           <a:prstGeom prst="roundRect">
@@ -5963,7 +5901,7 @@
         </p:nvSpPr>
         <p:spPr>
           <a:xfrm>
-            <a:off x="9007969" y="5175605"/>
+            <a:off x="9007969" y="4991436"/>
             <a:ext cx="200931" cy="200931"/>
           </a:xfrm>
           <a:prstGeom prst="ellipse">
@@ -6014,7 +5952,7 @@
         </p:nvSpPr>
         <p:spPr>
           <a:xfrm>
-            <a:off x="10559680" y="5173841"/>
+            <a:off x="10559680" y="4989672"/>
             <a:ext cx="200931" cy="200931"/>
           </a:xfrm>
           <a:prstGeom prst="ellipse">
@@ -6065,7 +6003,7 @@
         </p:nvSpPr>
         <p:spPr>
           <a:xfrm>
-            <a:off x="7717917" y="5005526"/>
+            <a:off x="7717917" y="4821357"/>
             <a:ext cx="1812053" cy="145628"/>
           </a:xfrm>
           <a:prstGeom prst="roundRect">
@@ -6111,7 +6049,7 @@
         </p:nvSpPr>
         <p:spPr>
           <a:xfrm>
-            <a:off x="7679726" y="4974130"/>
+            <a:off x="7679726" y="4789961"/>
             <a:ext cx="200931" cy="200931"/>
           </a:xfrm>
           <a:prstGeom prst="ellipse">
@@ -6170,7 +6108,7 @@
         </p:nvSpPr>
         <p:spPr>
           <a:xfrm>
-            <a:off x="8303131" y="4967841"/>
+            <a:off x="8303131" y="4783672"/>
             <a:ext cx="200931" cy="200931"/>
           </a:xfrm>
           <a:prstGeom prst="ellipse">
@@ -6221,7 +6159,7 @@
         </p:nvSpPr>
         <p:spPr>
           <a:xfrm>
-            <a:off x="9517592" y="5002177"/>
+            <a:off x="9517592" y="4818008"/>
             <a:ext cx="1476384" cy="157340"/>
           </a:xfrm>
           <a:prstGeom prst="roundRect">
@@ -6265,7 +6203,7 @@
         </p:nvSpPr>
         <p:spPr>
           <a:xfrm>
-            <a:off x="9397710" y="4971124"/>
+            <a:off x="9397710" y="4786955"/>
             <a:ext cx="200931" cy="200931"/>
           </a:xfrm>
           <a:prstGeom prst="ellipse">
@@ -6316,7 +6254,7 @@
         </p:nvSpPr>
         <p:spPr>
           <a:xfrm>
-            <a:off x="10949421" y="4969360"/>
+            <a:off x="10949421" y="4785191"/>
             <a:ext cx="200931" cy="200931"/>
           </a:xfrm>
           <a:prstGeom prst="ellipse">
@@ -6367,7 +6305,7 @@
         </p:nvSpPr>
         <p:spPr>
           <a:xfrm>
-            <a:off x="5141845" y="5294400"/>
+            <a:off x="5141845" y="5110231"/>
             <a:ext cx="1155457" cy="576140"/>
           </a:xfrm>
           <a:prstGeom prst="rect">
@@ -6436,7 +6374,7 @@
         </p:nvSpPr>
         <p:spPr>
           <a:xfrm>
-            <a:off x="7363010" y="5278327"/>
+            <a:off x="3498534" y="4884384"/>
             <a:ext cx="936161" cy="911281"/>
           </a:xfrm>
           <a:prstGeom prst="rect">
@@ -6831,7 +6769,7 @@
         </p:nvSpPr>
         <p:spPr>
           <a:xfrm>
-            <a:off x="9332569" y="5292307"/>
+            <a:off x="9332569" y="5108138"/>
             <a:ext cx="1177206" cy="620079"/>
           </a:xfrm>
           <a:prstGeom prst="rect">
@@ -7489,7 +7427,7 @@
         </p:nvSpPr>
         <p:spPr>
           <a:xfrm>
-            <a:off x="5022284" y="5210208"/>
+            <a:off x="5022284" y="5026039"/>
             <a:ext cx="200931" cy="200931"/>
           </a:xfrm>
           <a:prstGeom prst="ellipse">
@@ -7553,7 +7491,7 @@
         </p:nvSpPr>
         <p:spPr>
           <a:xfrm>
-            <a:off x="7302304" y="5187861"/>
+            <a:off x="3437828" y="4793918"/>
             <a:ext cx="200931" cy="200931"/>
           </a:xfrm>
           <a:prstGeom prst="ellipse">
@@ -7617,7 +7555,7 @@
         </p:nvSpPr>
         <p:spPr>
           <a:xfrm>
-            <a:off x="9243320" y="5212762"/>
+            <a:off x="9243320" y="5028593"/>
             <a:ext cx="200931" cy="200931"/>
           </a:xfrm>
           <a:prstGeom prst="ellipse">
@@ -7664,6 +7602,296 @@
           <a:p>
             <a:pPr algn="ctr"/>
             <a:endParaRPr lang="en-AU"/>
+          </a:p>
+        </p:txBody>
+      </p:sp>
+      <p:sp>
+        <p:nvSpPr>
+          <p:cNvPr id="98" name="Rectangle 97">
+            <a:extLst>
+              <a:ext uri="{FF2B5EF4-FFF2-40B4-BE49-F238E27FC236}">
+                <a16:creationId xmlns:a16="http://schemas.microsoft.com/office/drawing/2014/main" id="{361E18B3-53C5-49F0-8EC2-A7D9BB82D8C5}"/>
+              </a:ext>
+            </a:extLst>
+          </p:cNvPr>
+          <p:cNvSpPr/>
+          <p:nvPr/>
+        </p:nvSpPr>
+        <p:spPr>
+          <a:xfrm>
+            <a:off x="207171" y="5879857"/>
+            <a:ext cx="11666150" cy="805511"/>
+          </a:xfrm>
+          <a:prstGeom prst="rect">
+            <a:avLst/>
+          </a:prstGeom>
+        </p:spPr>
+        <p:style>
+          <a:lnRef idx="1">
+            <a:schemeClr val="accent1"/>
+          </a:lnRef>
+          <a:fillRef idx="2">
+            <a:schemeClr val="accent1"/>
+          </a:fillRef>
+          <a:effectRef idx="1">
+            <a:schemeClr val="accent1"/>
+          </a:effectRef>
+          <a:fontRef idx="minor">
+            <a:schemeClr val="dk1"/>
+          </a:fontRef>
+        </p:style>
+        <p:txBody>
+          <a:bodyPr rtlCol="0" anchor="t"/>
+          <a:lstStyle/>
+          <a:p>
+            <a:r>
+              <a:rPr lang="en-AU" dirty="0"/>
+              <a:t>Node View</a:t>
+            </a:r>
+          </a:p>
+        </p:txBody>
+      </p:sp>
+      <p:sp>
+        <p:nvSpPr>
+          <p:cNvPr id="22" name="TextBox 21">
+            <a:extLst>
+              <a:ext uri="{FF2B5EF4-FFF2-40B4-BE49-F238E27FC236}">
+                <a16:creationId xmlns:a16="http://schemas.microsoft.com/office/drawing/2014/main" id="{FE9899E3-611B-414A-8E5B-4964145DFCC7}"/>
+              </a:ext>
+            </a:extLst>
+          </p:cNvPr>
+          <p:cNvSpPr txBox="1"/>
+          <p:nvPr/>
+        </p:nvSpPr>
+        <p:spPr>
+          <a:xfrm>
+            <a:off x="-1397365" y="4819752"/>
+            <a:ext cx="1636935" cy="369332"/>
+          </a:xfrm>
+          <a:prstGeom prst="rect">
+            <a:avLst/>
+          </a:prstGeom>
+        </p:spPr>
+        <p:style>
+          <a:lnRef idx="0">
+            <a:schemeClr val="accent4"/>
+          </a:lnRef>
+          <a:fillRef idx="3">
+            <a:schemeClr val="accent4"/>
+          </a:fillRef>
+          <a:effectRef idx="3">
+            <a:schemeClr val="accent4"/>
+          </a:effectRef>
+          <a:fontRef idx="minor">
+            <a:schemeClr val="lt1"/>
+          </a:fontRef>
+        </p:style>
+        <p:txBody>
+          <a:bodyPr wrap="square" rtlCol="0">
+            <a:spAutoFit/>
+          </a:bodyPr>
+          <a:lstStyle/>
+          <a:p>
+            <a:r>
+              <a:rPr lang="en-AU" dirty="0"/>
+              <a:t>Thing Selected</a:t>
+            </a:r>
+          </a:p>
+        </p:txBody>
+      </p:sp>
+      <p:sp>
+        <p:nvSpPr>
+          <p:cNvPr id="108" name="TextBox 107">
+            <a:extLst>
+              <a:ext uri="{FF2B5EF4-FFF2-40B4-BE49-F238E27FC236}">
+                <a16:creationId xmlns:a16="http://schemas.microsoft.com/office/drawing/2014/main" id="{87C5705C-2DFB-45A7-BDFE-7579B402C473}"/>
+              </a:ext>
+            </a:extLst>
+          </p:cNvPr>
+          <p:cNvSpPr txBox="1"/>
+          <p:nvPr/>
+        </p:nvSpPr>
+        <p:spPr>
+          <a:xfrm>
+            <a:off x="11873321" y="3574682"/>
+            <a:ext cx="2181823" cy="646331"/>
+          </a:xfrm>
+          <a:prstGeom prst="rect">
+            <a:avLst/>
+          </a:prstGeom>
+        </p:spPr>
+        <p:style>
+          <a:lnRef idx="0">
+            <a:schemeClr val="accent4"/>
+          </a:lnRef>
+          <a:fillRef idx="3">
+            <a:schemeClr val="accent4"/>
+          </a:fillRef>
+          <a:effectRef idx="3">
+            <a:schemeClr val="accent4"/>
+          </a:effectRef>
+          <a:fontRef idx="minor">
+            <a:schemeClr val="lt1"/>
+          </a:fontRef>
+        </p:style>
+        <p:txBody>
+          <a:bodyPr wrap="square" rtlCol="0">
+            <a:spAutoFit/>
+          </a:bodyPr>
+          <a:lstStyle/>
+          <a:p>
+            <a:r>
+              <a:rPr lang="en-AU" sz="1200" dirty="0"/>
+              <a:t>Properties that are animated create channels for </a:t>
+            </a:r>
+            <a:r>
+              <a:rPr lang="en-AU" sz="1200" b="1" dirty="0"/>
+              <a:t>Thing Selected</a:t>
+            </a:r>
+          </a:p>
+        </p:txBody>
+      </p:sp>
+      <p:sp>
+        <p:nvSpPr>
+          <p:cNvPr id="109" name="TextBox 108">
+            <a:extLst>
+              <a:ext uri="{FF2B5EF4-FFF2-40B4-BE49-F238E27FC236}">
+                <a16:creationId xmlns:a16="http://schemas.microsoft.com/office/drawing/2014/main" id="{B3190842-9155-41DD-B2F9-7CAAF982F57E}"/>
+              </a:ext>
+            </a:extLst>
+          </p:cNvPr>
+          <p:cNvSpPr txBox="1"/>
+          <p:nvPr/>
+        </p:nvSpPr>
+        <p:spPr>
+          <a:xfrm>
+            <a:off x="9917013" y="2388866"/>
+            <a:ext cx="1636935" cy="584775"/>
+          </a:xfrm>
+          <a:prstGeom prst="rect">
+            <a:avLst/>
+          </a:prstGeom>
+        </p:spPr>
+        <p:style>
+          <a:lnRef idx="0">
+            <a:schemeClr val="accent4"/>
+          </a:lnRef>
+          <a:fillRef idx="3">
+            <a:schemeClr val="accent4"/>
+          </a:fillRef>
+          <a:effectRef idx="3">
+            <a:schemeClr val="accent4"/>
+          </a:effectRef>
+          <a:fontRef idx="minor">
+            <a:schemeClr val="lt1"/>
+          </a:fontRef>
+        </p:style>
+        <p:txBody>
+          <a:bodyPr wrap="square" rtlCol="0">
+            <a:spAutoFit/>
+          </a:bodyPr>
+          <a:lstStyle/>
+          <a:p>
+            <a:r>
+              <a:rPr lang="en-AU" sz="1600" dirty="0"/>
+              <a:t>Properties of Thing Selected</a:t>
+            </a:r>
+          </a:p>
+        </p:txBody>
+      </p:sp>
+      <p:sp>
+        <p:nvSpPr>
+          <p:cNvPr id="111" name="TextBox 110">
+            <a:extLst>
+              <a:ext uri="{FF2B5EF4-FFF2-40B4-BE49-F238E27FC236}">
+                <a16:creationId xmlns:a16="http://schemas.microsoft.com/office/drawing/2014/main" id="{C33A6353-AD98-495E-BC5F-F944F4226177}"/>
+              </a:ext>
+            </a:extLst>
+          </p:cNvPr>
+          <p:cNvSpPr txBox="1"/>
+          <p:nvPr/>
+        </p:nvSpPr>
+        <p:spPr>
+          <a:xfrm>
+            <a:off x="6222232" y="3065055"/>
+            <a:ext cx="2145211" cy="369332"/>
+          </a:xfrm>
+          <a:prstGeom prst="rect">
+            <a:avLst/>
+          </a:prstGeom>
+        </p:spPr>
+        <p:style>
+          <a:lnRef idx="0">
+            <a:schemeClr val="accent4"/>
+          </a:lnRef>
+          <a:fillRef idx="3">
+            <a:schemeClr val="accent4"/>
+          </a:fillRef>
+          <a:effectRef idx="3">
+            <a:schemeClr val="accent4"/>
+          </a:effectRef>
+          <a:fontRef idx="minor">
+            <a:schemeClr val="lt1"/>
+          </a:fontRef>
+        </p:style>
+        <p:txBody>
+          <a:bodyPr wrap="square" rtlCol="0">
+            <a:spAutoFit/>
+          </a:bodyPr>
+          <a:lstStyle/>
+          <a:p>
+            <a:r>
+              <a:rPr lang="en-AU" dirty="0"/>
+              <a:t>Thing Selected</a:t>
+            </a:r>
+          </a:p>
+        </p:txBody>
+      </p:sp>
+      <p:sp>
+        <p:nvSpPr>
+          <p:cNvPr id="112" name="TextBox 111">
+            <a:extLst>
+              <a:ext uri="{FF2B5EF4-FFF2-40B4-BE49-F238E27FC236}">
+                <a16:creationId xmlns:a16="http://schemas.microsoft.com/office/drawing/2014/main" id="{B12C5F18-F6BD-4E75-9367-6806E0C33163}"/>
+              </a:ext>
+            </a:extLst>
+          </p:cNvPr>
+          <p:cNvSpPr txBox="1"/>
+          <p:nvPr/>
+        </p:nvSpPr>
+        <p:spPr>
+          <a:xfrm>
+            <a:off x="1142231" y="1024522"/>
+            <a:ext cx="1094402" cy="369332"/>
+          </a:xfrm>
+          <a:prstGeom prst="rect">
+            <a:avLst/>
+          </a:prstGeom>
+        </p:spPr>
+        <p:style>
+          <a:lnRef idx="0">
+            <a:schemeClr val="accent4"/>
+          </a:lnRef>
+          <a:fillRef idx="3">
+            <a:schemeClr val="accent4"/>
+          </a:fillRef>
+          <a:effectRef idx="3">
+            <a:schemeClr val="accent4"/>
+          </a:effectRef>
+          <a:fontRef idx="minor">
+            <a:schemeClr val="lt1"/>
+          </a:fontRef>
+        </p:style>
+        <p:txBody>
+          <a:bodyPr wrap="square" rtlCol="0">
+            <a:spAutoFit/>
+          </a:bodyPr>
+          <a:lstStyle/>
+          <a:p>
+            <a:r>
+              <a:rPr lang="en-AU" dirty="0"/>
+              <a:t>or Scenes</a:t>
+            </a:r>
           </a:p>
         </p:txBody>
       </p:sp>

</xml_diff>